<commit_message>
L03 Update home works overview
</commit_message>
<xml_diff>
--- a/Lectures/Lesson 03 - Home Task Overview.pptx
+++ b/Lectures/Lesson 03 - Home Task Overview.pptx
@@ -206,7 +206,7 @@
           <a:p>
             <a:fld id="{2CD3B9FB-3495-4939-BD76-7F0D9D7D32B7}" type="datetimeFigureOut">
               <a:rPr lang="en-US" smtClean="0"/>
-              <a:t>27-Oct-18</a:t>
+              <a:t>10/28/2018</a:t>
             </a:fld>
             <a:endParaRPr lang="en-US"/>
           </a:p>
@@ -364,7 +364,7 @@
           <a:p>
             <a:fld id="{7DAB874B-A473-4B36-B711-1F4E2AA2CAB3}" type="slidenum">
               <a:rPr lang="en-US" smtClean="0"/>
-              <a:t>‹№›</a:t>
+              <a:t>‹#›</a:t>
             </a:fld>
             <a:endParaRPr lang="en-US"/>
           </a:p>
@@ -1403,7 +1403,7 @@
           <a:p>
             <a:fld id="{243CF121-E856-45B2-8C6E-E03D14472C3D}" type="datetime1">
               <a:rPr lang="en-US" smtClean="0"/>
-              <a:t>27-Oct-18</a:t>
+              <a:t>10/28/2018</a:t>
             </a:fld>
             <a:endParaRPr lang="en-US"/>
           </a:p>
@@ -1445,7 +1445,7 @@
           <a:p>
             <a:fld id="{C11E3E32-FD85-4051-B32D-C1D899658A24}" type="slidenum">
               <a:rPr lang="en-US" smtClean="0"/>
-              <a:t>‹№›</a:t>
+              <a:t>‹#›</a:t>
             </a:fld>
             <a:endParaRPr lang="en-US"/>
           </a:p>
@@ -1571,7 +1571,7 @@
           <a:p>
             <a:fld id="{0C153C3D-EFFD-4B00-AF13-AAEE29ABB4F2}" type="datetime1">
               <a:rPr lang="en-US" smtClean="0"/>
-              <a:t>27-Oct-18</a:t>
+              <a:t>10/28/2018</a:t>
             </a:fld>
             <a:endParaRPr lang="en-US"/>
           </a:p>
@@ -1613,7 +1613,7 @@
           <a:p>
             <a:fld id="{C11E3E32-FD85-4051-B32D-C1D899658A24}" type="slidenum">
               <a:rPr lang="en-US" smtClean="0"/>
-              <a:t>‹№›</a:t>
+              <a:t>‹#›</a:t>
             </a:fld>
             <a:endParaRPr lang="en-US"/>
           </a:p>
@@ -1749,7 +1749,7 @@
           <a:p>
             <a:fld id="{0EF8B7CE-7D2E-4D7A-A91C-EDD1ABE38FFD}" type="datetime1">
               <a:rPr lang="en-US" smtClean="0"/>
-              <a:t>27-Oct-18</a:t>
+              <a:t>10/28/2018</a:t>
             </a:fld>
             <a:endParaRPr lang="en-US"/>
           </a:p>
@@ -1791,7 +1791,7 @@
           <a:p>
             <a:fld id="{C11E3E32-FD85-4051-B32D-C1D899658A24}" type="slidenum">
               <a:rPr lang="en-US" smtClean="0"/>
-              <a:t>‹№›</a:t>
+              <a:t>‹#›</a:t>
             </a:fld>
             <a:endParaRPr lang="en-US"/>
           </a:p>
@@ -1917,7 +1917,7 @@
           <a:p>
             <a:fld id="{C5608847-DF7B-479B-85A8-6BEDD927E99B}" type="datetime1">
               <a:rPr lang="en-US" smtClean="0"/>
-              <a:t>27-Oct-18</a:t>
+              <a:t>10/28/2018</a:t>
             </a:fld>
             <a:endParaRPr lang="en-US"/>
           </a:p>
@@ -1959,7 +1959,7 @@
           <a:p>
             <a:fld id="{C11E3E32-FD85-4051-B32D-C1D899658A24}" type="slidenum">
               <a:rPr lang="en-US" smtClean="0"/>
-              <a:t>‹№›</a:t>
+              <a:t>‹#›</a:t>
             </a:fld>
             <a:endParaRPr lang="en-US"/>
           </a:p>
@@ -2162,7 +2162,7 @@
           <a:p>
             <a:fld id="{4FBAEFBA-F849-4B29-90C9-04CA3A99CF6E}" type="datetime1">
               <a:rPr lang="en-US" smtClean="0"/>
-              <a:t>27-Oct-18</a:t>
+              <a:t>10/28/2018</a:t>
             </a:fld>
             <a:endParaRPr lang="en-US"/>
           </a:p>
@@ -2204,7 +2204,7 @@
           <a:p>
             <a:fld id="{C11E3E32-FD85-4051-B32D-C1D899658A24}" type="slidenum">
               <a:rPr lang="en-US" smtClean="0"/>
-              <a:t>‹№›</a:t>
+              <a:t>‹#›</a:t>
             </a:fld>
             <a:endParaRPr lang="en-US"/>
           </a:p>
@@ -2391,7 +2391,7 @@
           <a:p>
             <a:fld id="{41DF16BF-E90E-45B9-936A-18160831A253}" type="datetime1">
               <a:rPr lang="en-US" smtClean="0"/>
-              <a:t>27-Oct-18</a:t>
+              <a:t>10/28/2018</a:t>
             </a:fld>
             <a:endParaRPr lang="en-US"/>
           </a:p>
@@ -2433,7 +2433,7 @@
           <a:p>
             <a:fld id="{C11E3E32-FD85-4051-B32D-C1D899658A24}" type="slidenum">
               <a:rPr lang="en-US" smtClean="0"/>
-              <a:t>‹№›</a:t>
+              <a:t>‹#›</a:t>
             </a:fld>
             <a:endParaRPr lang="en-US"/>
           </a:p>
@@ -2755,7 +2755,7 @@
           <a:p>
             <a:fld id="{4548C257-5A38-4742-B227-5C6D8D22E905}" type="datetime1">
               <a:rPr lang="en-US" smtClean="0"/>
-              <a:t>27-Oct-18</a:t>
+              <a:t>10/28/2018</a:t>
             </a:fld>
             <a:endParaRPr lang="en-US"/>
           </a:p>
@@ -2797,7 +2797,7 @@
           <a:p>
             <a:fld id="{C11E3E32-FD85-4051-B32D-C1D899658A24}" type="slidenum">
               <a:rPr lang="en-US" smtClean="0"/>
-              <a:t>‹№›</a:t>
+              <a:t>‹#›</a:t>
             </a:fld>
             <a:endParaRPr lang="en-US"/>
           </a:p>
@@ -2872,7 +2872,7 @@
           <a:p>
             <a:fld id="{019BA75F-1AAF-47E3-843C-6C1905B0DCAD}" type="datetime1">
               <a:rPr lang="en-US" smtClean="0"/>
-              <a:t>27-Oct-18</a:t>
+              <a:t>10/28/2018</a:t>
             </a:fld>
             <a:endParaRPr lang="en-US"/>
           </a:p>
@@ -2914,7 +2914,7 @@
           <a:p>
             <a:fld id="{C11E3E32-FD85-4051-B32D-C1D899658A24}" type="slidenum">
               <a:rPr lang="en-US" smtClean="0"/>
-              <a:t>‹№›</a:t>
+              <a:t>‹#›</a:t>
             </a:fld>
             <a:endParaRPr lang="en-US"/>
           </a:p>
@@ -2967,7 +2967,7 @@
           <a:p>
             <a:fld id="{8E3BBF73-4445-4E8C-9B2A-7EA5C7405416}" type="datetime1">
               <a:rPr lang="en-US" smtClean="0"/>
-              <a:t>27-Oct-18</a:t>
+              <a:t>10/28/2018</a:t>
             </a:fld>
             <a:endParaRPr lang="en-US"/>
           </a:p>
@@ -3009,7 +3009,7 @@
           <a:p>
             <a:fld id="{C11E3E32-FD85-4051-B32D-C1D899658A24}" type="slidenum">
               <a:rPr lang="en-US" smtClean="0"/>
-              <a:t>‹№›</a:t>
+              <a:t>‹#›</a:t>
             </a:fld>
             <a:endParaRPr lang="en-US"/>
           </a:p>
@@ -3242,7 +3242,7 @@
           <a:p>
             <a:fld id="{9F39D6E4-CED5-4522-AAB4-0BA0869DBDEC}" type="datetime1">
               <a:rPr lang="en-US" smtClean="0"/>
-              <a:t>27-Oct-18</a:t>
+              <a:t>10/28/2018</a:t>
             </a:fld>
             <a:endParaRPr lang="en-US"/>
           </a:p>
@@ -3284,7 +3284,7 @@
           <a:p>
             <a:fld id="{C11E3E32-FD85-4051-B32D-C1D899658A24}" type="slidenum">
               <a:rPr lang="en-US" smtClean="0"/>
-              <a:t>‹№›</a:t>
+              <a:t>‹#›</a:t>
             </a:fld>
             <a:endParaRPr lang="en-US"/>
           </a:p>
@@ -3494,7 +3494,7 @@
           <a:p>
             <a:fld id="{F3ED2022-4C1A-4AA8-B502-9EFA2336A38A}" type="datetime1">
               <a:rPr lang="en-US" smtClean="0"/>
-              <a:t>27-Oct-18</a:t>
+              <a:t>10/28/2018</a:t>
             </a:fld>
             <a:endParaRPr lang="en-US"/>
           </a:p>
@@ -3536,7 +3536,7 @@
           <a:p>
             <a:fld id="{C11E3E32-FD85-4051-B32D-C1D899658A24}" type="slidenum">
               <a:rPr lang="en-US" smtClean="0"/>
-              <a:t>‹№›</a:t>
+              <a:t>‹#›</a:t>
             </a:fld>
             <a:endParaRPr lang="en-US"/>
           </a:p>
@@ -3705,7 +3705,7 @@
           <a:p>
             <a:fld id="{E8F4AD22-7DD9-40FC-9E2C-81F56AB82C00}" type="datetime1">
               <a:rPr lang="en-US" smtClean="0"/>
-              <a:t>27-Oct-18</a:t>
+              <a:t>10/28/2018</a:t>
             </a:fld>
             <a:endParaRPr lang="en-US"/>
           </a:p>
@@ -3783,7 +3783,7 @@
           <a:p>
             <a:fld id="{C11E3E32-FD85-4051-B32D-C1D899658A24}" type="slidenum">
               <a:rPr lang="en-US" smtClean="0"/>
-              <a:t>‹№›</a:t>
+              <a:t>‹#›</a:t>
             </a:fld>
             <a:endParaRPr lang="en-US"/>
           </a:p>
@@ -4362,8 +4362,12 @@
               </a:spcAft>
             </a:pPr>
             <a:r>
+              <a:rPr lang="en-US" altLang="en-US" dirty="0" smtClean="0"/>
+              <a:t>L03-T1 {</a:t>
+            </a:r>
+            <a:r>
               <a:rPr lang="en-US" altLang="en-US" dirty="0"/>
-              <a:t>L03-T1{ Task 1 } </a:t>
+              <a:t> Task 1 } </a:t>
             </a:r>
           </a:p>
           <a:p>
@@ -5058,7 +5062,7 @@
         </p:blipFill>
         <p:spPr>
           <a:xfrm>
-            <a:off x="838200" y="1690688"/>
+            <a:off x="889001" y="1690688"/>
             <a:ext cx="8831558" cy="1325562"/>
           </a:xfrm>
           <a:prstGeom prst="rect">
@@ -5185,7 +5189,7 @@
         </p:blipFill>
         <p:spPr>
           <a:xfrm>
-            <a:off x="766281" y="1690688"/>
+            <a:off x="834017" y="1690688"/>
             <a:ext cx="10620869" cy="1325563"/>
           </a:xfrm>
           <a:prstGeom prst="rect">

</xml_diff>